<commit_message>
Apply Thymeleaf Pagination, Internationalization, Codelist, FileUpload, FileDownload, Ajax, HealthCheck, DateAndTime, JodaTime, OAuth, SecureLoginDemo, TutorialTodo, TutorialREST, TutorialSession, TutorialSecurity and Add JavaScript template, Decoupled Template Logic, Attention of Debug #3174
</commit_message>
<xml_diff>
--- a/source/ArchitectureInDetail/WebApplicationDetail/images_CodeList/materialCodeList.pptx
+++ b/source/ArchitectureInDetail/WebApplicationDetail/images_CodeList/materialCodeList.pptx
@@ -213,7 +213,7 @@
             <a:fld id="{3BB47352-BF5A-4CD2-B029-996118CD8E01}" type="datetimeFigureOut">
               <a:rPr kumimoji="1" lang="ja-JP" altLang="en-US" smtClean="0"/>
               <a:pPr/>
-              <a:t>2015/10/7</a:t>
+              <a:t>2018/1/22</a:t>
             </a:fld>
             <a:endParaRPr kumimoji="1" lang="ja-JP" altLang="en-US" dirty="0"/>
           </a:p>
@@ -696,7 +696,7 @@
             <a:fld id="{7B9B12EC-6AA0-374B-A2D3-850081A07A26}" type="datetimeFigureOut">
               <a:rPr kumimoji="1" lang="ja-JP" altLang="en-US" smtClean="0"/>
               <a:pPr/>
-              <a:t>2015/10/7</a:t>
+              <a:t>2018/1/22</a:t>
             </a:fld>
             <a:endParaRPr kumimoji="1" lang="ja-JP" altLang="en-US" dirty="0"/>
           </a:p>
@@ -900,7 +900,7 @@
             <a:fld id="{7B9B12EC-6AA0-374B-A2D3-850081A07A26}" type="datetimeFigureOut">
               <a:rPr kumimoji="1" lang="ja-JP" altLang="en-US" smtClean="0"/>
               <a:pPr/>
-              <a:t>2015/10/7</a:t>
+              <a:t>2018/1/22</a:t>
             </a:fld>
             <a:endParaRPr kumimoji="1" lang="ja-JP" altLang="en-US" dirty="0"/>
           </a:p>
@@ -1114,7 +1114,7 @@
             <a:fld id="{7B9B12EC-6AA0-374B-A2D3-850081A07A26}" type="datetimeFigureOut">
               <a:rPr kumimoji="1" lang="ja-JP" altLang="en-US" smtClean="0"/>
               <a:pPr/>
-              <a:t>2015/10/7</a:t>
+              <a:t>2018/1/22</a:t>
             </a:fld>
             <a:endParaRPr kumimoji="1" lang="ja-JP" altLang="en-US" dirty="0"/>
           </a:p>
@@ -1318,7 +1318,7 @@
             <a:fld id="{7B9B12EC-6AA0-374B-A2D3-850081A07A26}" type="datetimeFigureOut">
               <a:rPr kumimoji="1" lang="ja-JP" altLang="en-US" smtClean="0"/>
               <a:pPr/>
-              <a:t>2015/10/7</a:t>
+              <a:t>2018/1/22</a:t>
             </a:fld>
             <a:endParaRPr kumimoji="1" lang="ja-JP" altLang="en-US" dirty="0"/>
           </a:p>
@@ -1566,7 +1566,7 @@
             <a:fld id="{7B9B12EC-6AA0-374B-A2D3-850081A07A26}" type="datetimeFigureOut">
               <a:rPr kumimoji="1" lang="ja-JP" altLang="en-US" smtClean="0"/>
               <a:pPr/>
-              <a:t>2015/10/7</a:t>
+              <a:t>2018/1/22</a:t>
             </a:fld>
             <a:endParaRPr kumimoji="1" lang="ja-JP" altLang="en-US" dirty="0"/>
           </a:p>
@@ -1920,7 +1920,7 @@
             <a:fld id="{7B9B12EC-6AA0-374B-A2D3-850081A07A26}" type="datetimeFigureOut">
               <a:rPr kumimoji="1" lang="ja-JP" altLang="en-US" smtClean="0"/>
               <a:pPr/>
-              <a:t>2015/10/7</a:t>
+              <a:t>2018/1/22</a:t>
             </a:fld>
             <a:endParaRPr kumimoji="1" lang="ja-JP" altLang="en-US" dirty="0"/>
           </a:p>
@@ -2408,7 +2408,7 @@
             <a:fld id="{7B9B12EC-6AA0-374B-A2D3-850081A07A26}" type="datetimeFigureOut">
               <a:rPr kumimoji="1" lang="ja-JP" altLang="en-US" smtClean="0"/>
               <a:pPr/>
-              <a:t>2015/10/7</a:t>
+              <a:t>2018/1/22</a:t>
             </a:fld>
             <a:endParaRPr kumimoji="1" lang="ja-JP" altLang="en-US" dirty="0"/>
           </a:p>
@@ -2528,7 +2528,7 @@
             <a:fld id="{7B9B12EC-6AA0-374B-A2D3-850081A07A26}" type="datetimeFigureOut">
               <a:rPr kumimoji="1" lang="ja-JP" altLang="en-US" smtClean="0"/>
               <a:pPr/>
-              <a:t>2015/10/7</a:t>
+              <a:t>2018/1/22</a:t>
             </a:fld>
             <a:endParaRPr kumimoji="1" lang="ja-JP" altLang="en-US" dirty="0"/>
           </a:p>
@@ -2625,7 +2625,7 @@
             <a:fld id="{7B9B12EC-6AA0-374B-A2D3-850081A07A26}" type="datetimeFigureOut">
               <a:rPr kumimoji="1" lang="ja-JP" altLang="en-US" smtClean="0"/>
               <a:pPr/>
-              <a:t>2015/10/7</a:t>
+              <a:t>2018/1/22</a:t>
             </a:fld>
             <a:endParaRPr kumimoji="1" lang="ja-JP" altLang="en-US" dirty="0"/>
           </a:p>
@@ -2936,7 +2936,7 @@
             <a:fld id="{7B9B12EC-6AA0-374B-A2D3-850081A07A26}" type="datetimeFigureOut">
               <a:rPr kumimoji="1" lang="ja-JP" altLang="en-US" smtClean="0"/>
               <a:pPr/>
-              <a:t>2015/10/7</a:t>
+              <a:t>2018/1/22</a:t>
             </a:fld>
             <a:endParaRPr kumimoji="1" lang="ja-JP" altLang="en-US" dirty="0"/>
           </a:p>
@@ -3191,7 +3191,7 @@
             <a:fld id="{7B9B12EC-6AA0-374B-A2D3-850081A07A26}" type="datetimeFigureOut">
               <a:rPr kumimoji="1" lang="ja-JP" altLang="en-US" smtClean="0"/>
               <a:pPr/>
-              <a:t>2015/10/7</a:t>
+              <a:t>2018/1/22</a:t>
             </a:fld>
             <a:endParaRPr kumimoji="1" lang="ja-JP" altLang="en-US" dirty="0"/>
           </a:p>
@@ -3438,7 +3438,7 @@
             <a:fld id="{7B9B12EC-6AA0-374B-A2D3-850081A07A26}" type="datetimeFigureOut">
               <a:rPr kumimoji="1" lang="ja-JP" altLang="en-US" smtClean="0"/>
               <a:pPr/>
-              <a:t>2015/10/7</a:t>
+              <a:t>2018/1/22</a:t>
             </a:fld>
             <a:endParaRPr kumimoji="1" lang="ja-JP" altLang="en-US" dirty="0"/>
           </a:p>
@@ -4836,8 +4836,8 @@
         </p:nvSpPr>
         <p:spPr>
           <a:xfrm>
-            <a:off x="5305426" y="3372486"/>
-            <a:ext cx="3510755" cy="855978"/>
+            <a:off x="5305875" y="3013385"/>
+            <a:ext cx="3733354" cy="1138882"/>
           </a:xfrm>
           <a:prstGeom prst="rect">
             <a:avLst/>
@@ -4869,48 +4869,235 @@
           <a:lstStyle/>
           <a:p>
             <a:r>
+              <a:rPr lang="en-US" altLang="ja-JP" sz="1200" b="1" dirty="0">
+                <a:solidFill>
+                  <a:schemeClr val="tx1"/>
+                </a:solidFill>
+              </a:rPr>
+              <a:t>&lt;select </a:t>
+            </a:r>
+            <a:r>
+              <a:rPr lang="en-US" altLang="ja-JP" sz="1200" b="1" dirty="0" err="1">
+                <a:solidFill>
+                  <a:schemeClr val="tx1"/>
+                </a:solidFill>
+              </a:rPr>
+              <a:t>th:field</a:t>
+            </a:r>
+            <a:r>
               <a:rPr lang="en-US" altLang="ja-JP" sz="1200" b="1" dirty="0" smtClean="0">
                 <a:solidFill>
                   <a:schemeClr val="tx1"/>
                 </a:solidFill>
               </a:rPr>
-              <a:t>&lt;form:select path="orderStatus“&gt;</a:t>
-            </a:r>
-          </a:p>
-          <a:p>
+              <a:t>=“*{</a:t>
+            </a:r>
+            <a:r>
+              <a:rPr lang="en-US" altLang="ja-JP" sz="1200" b="1" dirty="0" err="1" smtClean="0">
+                <a:solidFill>
+                  <a:schemeClr val="tx1"/>
+                </a:solidFill>
+              </a:rPr>
+              <a:t>orderStatus</a:t>
+            </a:r>
+            <a:r>
+              <a:rPr lang="en-US" altLang="ja-JP" sz="1200" b="1" dirty="0">
+                <a:solidFill>
+                  <a:schemeClr val="tx1"/>
+                </a:solidFill>
+              </a:rPr>
+              <a:t>}"&gt;</a:t>
+            </a:r>
+            <a:endParaRPr lang="en-US" altLang="ja-JP" sz="1200" b="1" dirty="0" smtClean="0">
+              <a:solidFill>
+                <a:schemeClr val="tx1"/>
+              </a:solidFill>
+            </a:endParaRPr>
+          </a:p>
+          <a:p>
+            <a:r>
+              <a:rPr lang="en-US" altLang="ja-JP" sz="1200" b="1" dirty="0">
+                <a:solidFill>
+                  <a:schemeClr val="tx1"/>
+                </a:solidFill>
+              </a:rPr>
+              <a:t>    &lt;option </a:t>
+            </a:r>
+            <a:r>
+              <a:rPr lang="en-US" altLang="ja-JP" sz="1200" b="1" dirty="0" err="1">
+                <a:solidFill>
+                  <a:schemeClr val="tx1"/>
+                </a:solidFill>
+              </a:rPr>
+              <a:t>th:each</a:t>
+            </a:r>
             <a:r>
               <a:rPr lang="en-US" altLang="ja-JP" sz="1200" b="1" dirty="0" smtClean="0">
                 <a:solidFill>
                   <a:schemeClr val="tx1"/>
                 </a:solidFill>
               </a:rPr>
-              <a:t>    &lt;form:options items=</a:t>
+              <a:t>=“order  </a:t>
             </a:r>
             <a:r>
               <a:rPr lang="en-US" altLang="ja-JP" sz="1200" b="1" dirty="0" smtClean="0">
                 <a:solidFill>
+                  <a:schemeClr val="tx1"/>
+                </a:solidFill>
+              </a:rPr>
+              <a:t>:  </a:t>
+            </a:r>
+            <a:r>
+              <a:rPr lang="en-US" altLang="ja-JP" sz="1200" b="1" dirty="0" smtClean="0">
+                <a:solidFill>
                   <a:srgbClr val="0070C0"/>
                 </a:solidFill>
               </a:rPr>
-              <a:t>"${CL_ORDERSTATUS}"</a:t>
+              <a:t>${</a:t>
+            </a:r>
+            <a:r>
+              <a:rPr lang="en-US" altLang="ja-JP" sz="1200" b="1" dirty="0">
+                <a:solidFill>
+                  <a:srgbClr val="0070C0"/>
+                </a:solidFill>
+              </a:rPr>
+              <a:t>CL_ORDERSTATUS</a:t>
             </a:r>
             <a:r>
               <a:rPr lang="en-US" altLang="ja-JP" sz="1200" b="1" dirty="0" smtClean="0">
                 <a:solidFill>
-                  <a:schemeClr val="tx1"/>
-                </a:solidFill>
-              </a:rPr>
-              <a:t> /&gt;</a:t>
-            </a:r>
-          </a:p>
-          <a:p>
+                  <a:srgbClr val="0070C0"/>
+                </a:solidFill>
+              </a:rPr>
+              <a:t>}“</a:t>
+            </a:r>
+          </a:p>
+          <a:p>
+            <a:r>
+              <a:rPr lang="en-US" altLang="ja-JP" sz="1200" b="1" dirty="0">
+                <a:solidFill>
+                  <a:srgbClr val="0070C0"/>
+                </a:solidFill>
+              </a:rPr>
+              <a:t> </a:t>
+            </a:r>
             <a:r>
               <a:rPr lang="en-US" altLang="ja-JP" sz="1200" b="1" dirty="0" smtClean="0">
                 <a:solidFill>
-                  <a:schemeClr val="tx1"/>
-                </a:solidFill>
-              </a:rPr>
-              <a:t>&lt;/form:select&gt;</a:t>
+                  <a:srgbClr val="0070C0"/>
+                </a:solidFill>
+              </a:rPr>
+              <a:t>    </a:t>
+            </a:r>
+            <a:r>
+              <a:rPr lang="en-US" altLang="ja-JP" sz="1200" b="1" dirty="0" smtClean="0">
+                <a:solidFill>
+                  <a:schemeClr val="tx1"/>
+                </a:solidFill>
+              </a:rPr>
+              <a:t> </a:t>
+            </a:r>
+            <a:r>
+              <a:rPr lang="en-US" altLang="ja-JP" sz="1200" b="1" dirty="0" err="1" smtClean="0">
+                <a:solidFill>
+                  <a:schemeClr val="tx1"/>
+                </a:solidFill>
+              </a:rPr>
+              <a:t>th:value</a:t>
+            </a:r>
+            <a:r>
+              <a:rPr lang="en-US" altLang="ja-JP" sz="1200" b="1" dirty="0" smtClean="0">
+                <a:solidFill>
+                  <a:schemeClr val="tx1"/>
+                </a:solidFill>
+              </a:rPr>
+              <a:t>="${</a:t>
+            </a:r>
+            <a:r>
+              <a:rPr lang="en-US" altLang="ja-JP" sz="1200" b="1" dirty="0" err="1" smtClean="0">
+                <a:solidFill>
+                  <a:schemeClr val="tx1"/>
+                </a:solidFill>
+              </a:rPr>
+              <a:t>order.key</a:t>
+            </a:r>
+            <a:r>
+              <a:rPr lang="en-US" altLang="ja-JP" sz="1200" b="1" dirty="0" smtClean="0">
+                <a:solidFill>
+                  <a:schemeClr val="tx1"/>
+                </a:solidFill>
+              </a:rPr>
+              <a:t>}“</a:t>
+            </a:r>
+          </a:p>
+          <a:p>
+            <a:r>
+              <a:rPr lang="en-US" altLang="ja-JP" sz="1200" b="1" dirty="0">
+                <a:solidFill>
+                  <a:schemeClr val="tx1"/>
+                </a:solidFill>
+              </a:rPr>
+              <a:t> </a:t>
+            </a:r>
+            <a:r>
+              <a:rPr lang="en-US" altLang="ja-JP" sz="1200" b="1" dirty="0" smtClean="0">
+                <a:solidFill>
+                  <a:schemeClr val="tx1"/>
+                </a:solidFill>
+              </a:rPr>
+              <a:t>     </a:t>
+            </a:r>
+            <a:r>
+              <a:rPr lang="en-US" altLang="ja-JP" sz="1200" b="1" dirty="0" err="1">
+                <a:solidFill>
+                  <a:schemeClr val="tx1"/>
+                </a:solidFill>
+              </a:rPr>
+              <a:t>th:text</a:t>
+            </a:r>
+            <a:r>
+              <a:rPr lang="en-US" altLang="ja-JP" sz="1200" b="1" dirty="0" smtClean="0">
+                <a:solidFill>
+                  <a:schemeClr val="tx1"/>
+                </a:solidFill>
+              </a:rPr>
+              <a:t>="${</a:t>
+            </a:r>
+            <a:r>
+              <a:rPr lang="en-US" altLang="ja-JP" sz="1200" b="1" dirty="0" err="1" smtClean="0">
+                <a:solidFill>
+                  <a:schemeClr val="tx1"/>
+                </a:solidFill>
+              </a:rPr>
+              <a:t>order.value</a:t>
+            </a:r>
+            <a:r>
+              <a:rPr lang="en-US" altLang="ja-JP" sz="1200" b="1" dirty="0" smtClean="0">
+                <a:solidFill>
+                  <a:schemeClr val="tx1"/>
+                </a:solidFill>
+              </a:rPr>
+              <a:t>}“ /&gt;Order Status</a:t>
+            </a:r>
+          </a:p>
+          <a:p>
+            <a:r>
+              <a:rPr lang="en-US" altLang="ja-JP" sz="1200" b="1" dirty="0" smtClean="0">
+                <a:solidFill>
+                  <a:schemeClr val="tx1"/>
+                </a:solidFill>
+              </a:rPr>
+              <a:t>    &lt;/option&gt;</a:t>
+            </a:r>
+          </a:p>
+          <a:p>
+            <a:r>
+              <a:rPr lang="en-US" altLang="ja-JP" sz="1200" b="1" dirty="0" smtClean="0">
+                <a:solidFill>
+                  <a:schemeClr val="tx1"/>
+                </a:solidFill>
+              </a:rPr>
+              <a:t>&lt;/select&gt;</a:t>
             </a:r>
           </a:p>
         </p:txBody>
@@ -5203,13 +5390,14 @@
           <p:cNvPr id="89" name="カギ線コネクタ 88"/>
           <p:cNvCxnSpPr>
             <a:stCxn id="6" idx="3"/>
+            <a:endCxn id="68" idx="1"/>
           </p:cNvCxnSpPr>
           <p:nvPr/>
         </p:nvCxnSpPr>
         <p:spPr>
           <a:xfrm>
             <a:off x="3829050" y="3148806"/>
-            <a:ext cx="1657350" cy="636592"/>
+            <a:ext cx="1476825" cy="434020"/>
           </a:xfrm>
           <a:prstGeom prst="bentConnector3">
             <a:avLst>
@@ -5246,7 +5434,7 @@
         </p:nvSpPr>
         <p:spPr>
           <a:xfrm>
-            <a:off x="5305426" y="3189924"/>
+            <a:off x="5286153" y="2789868"/>
             <a:ext cx="2562226" cy="182562"/>
           </a:xfrm>
           <a:prstGeom prst="rect">
@@ -5277,12 +5465,12 @@
           <a:lstStyle/>
           <a:p>
             <a:r>
-              <a:rPr kumimoji="1" lang="en-US" altLang="ja-JP" sz="1200" b="1" dirty="0" smtClean="0">
-                <a:solidFill>
-                  <a:schemeClr val="tx1"/>
-                </a:solidFill>
-              </a:rPr>
-              <a:t>JSP</a:t>
+              <a:rPr lang="en-US" altLang="ja-JP" sz="1200" b="1" dirty="0" err="1" smtClean="0">
+                <a:solidFill>
+                  <a:schemeClr val="tx1"/>
+                </a:solidFill>
+              </a:rPr>
+              <a:t>Thymeleaf</a:t>
             </a:r>
             <a:endParaRPr kumimoji="1" lang="ja-JP" altLang="en-US" sz="1200" dirty="0">
               <a:solidFill>
@@ -6596,8 +6784,8 @@
         </p:nvSpPr>
         <p:spPr>
           <a:xfrm>
-            <a:off x="5215731" y="2886923"/>
-            <a:ext cx="3928269" cy="337982"/>
+            <a:off x="5078633" y="2246785"/>
+            <a:ext cx="3830589" cy="1116001"/>
           </a:xfrm>
           <a:prstGeom prst="rect">
             <a:avLst/>
@@ -6629,12 +6817,246 @@
           <a:lstStyle/>
           <a:p>
             <a:r>
+              <a:rPr lang="en-US" altLang="ja-JP" sz="1200" b="1" dirty="0">
+                <a:solidFill>
+                  <a:schemeClr val="tx1"/>
+                </a:solidFill>
+              </a:rPr>
+              <a:t>&lt;select </a:t>
+            </a:r>
+            <a:r>
+              <a:rPr lang="en-US" altLang="ja-JP" sz="1200" b="1" dirty="0" err="1">
+                <a:solidFill>
+                  <a:schemeClr val="tx1"/>
+                </a:solidFill>
+              </a:rPr>
+              <a:t>th:field</a:t>
+            </a:r>
+            <a:r>
+              <a:rPr lang="en-US" altLang="ja-JP" sz="1200" b="1" dirty="0">
+                <a:solidFill>
+                  <a:schemeClr val="tx1"/>
+                </a:solidFill>
+              </a:rPr>
+              <a:t>=“*{</a:t>
+            </a:r>
+            <a:r>
+              <a:rPr lang="en-US" altLang="ja-JP" sz="1200" b="1" dirty="0" err="1">
+                <a:solidFill>
+                  <a:schemeClr val="tx1"/>
+                </a:solidFill>
+              </a:rPr>
+              <a:t>depMonth</a:t>
+            </a:r>
+            <a:r>
+              <a:rPr lang="en-US" altLang="ja-JP" sz="1200" b="1" dirty="0">
+                <a:solidFill>
+                  <a:schemeClr val="tx1"/>
+                </a:solidFill>
+              </a:rPr>
+              <a:t>}"&gt;</a:t>
+            </a:r>
+          </a:p>
+          <a:p>
+            <a:r>
+              <a:rPr lang="en-US" altLang="ja-JP" sz="1200" b="1" dirty="0">
+                <a:solidFill>
+                  <a:schemeClr val="tx1"/>
+                </a:solidFill>
+              </a:rPr>
+              <a:t>    &lt;</a:t>
+            </a:r>
+            <a:r>
               <a:rPr lang="en-US" altLang="ja-JP" sz="1200" b="1" dirty="0" smtClean="0">
                 <a:solidFill>
                   <a:schemeClr val="tx1"/>
                 </a:solidFill>
               </a:rPr>
-              <a:t>&lt;form:select path="depMonth" items="${CL_MONTH}" /&gt;</a:t>
+              <a:t>option </a:t>
+            </a:r>
+            <a:r>
+              <a:rPr lang="en-US" altLang="ja-JP" sz="1200" b="1" dirty="0" err="1" smtClean="0">
+                <a:solidFill>
+                  <a:schemeClr val="tx1"/>
+                </a:solidFill>
+              </a:rPr>
+              <a:t>th:each</a:t>
+            </a:r>
+            <a:r>
+              <a:rPr lang="en-US" altLang="ja-JP" sz="1200" b="1" dirty="0" smtClean="0">
+                <a:solidFill>
+                  <a:schemeClr val="tx1"/>
+                </a:solidFill>
+              </a:rPr>
+              <a:t>=“month </a:t>
+            </a:r>
+            <a:r>
+              <a:rPr lang="en-US" altLang="ja-JP" sz="1200" b="1" dirty="0">
+                <a:solidFill>
+                  <a:schemeClr val="tx1"/>
+                </a:solidFill>
+              </a:rPr>
+              <a:t>: </a:t>
+            </a:r>
+            <a:r>
+              <a:rPr lang="en-US" altLang="ja-JP" sz="1200" b="1" dirty="0">
+                <a:solidFill>
+                  <a:srgbClr val="0070C0"/>
+                </a:solidFill>
+              </a:rPr>
+              <a:t>${CL_MONTH</a:t>
+            </a:r>
+            <a:r>
+              <a:rPr lang="en-US" altLang="ja-JP" sz="1200" b="1" dirty="0" smtClean="0">
+                <a:solidFill>
+                  <a:srgbClr val="0070C0"/>
+                </a:solidFill>
+              </a:rPr>
+              <a:t>}</a:t>
+            </a:r>
+            <a:r>
+              <a:rPr lang="en-US" altLang="ja-JP" sz="1200" b="1" dirty="0" smtClean="0">
+                <a:solidFill>
+                  <a:schemeClr val="tx1"/>
+                </a:solidFill>
+              </a:rPr>
+              <a:t>" </a:t>
+            </a:r>
+          </a:p>
+          <a:p>
+            <a:r>
+              <a:rPr lang="en-US" altLang="ja-JP" sz="1200" b="1" dirty="0">
+                <a:solidFill>
+                  <a:schemeClr val="tx1"/>
+                </a:solidFill>
+              </a:rPr>
+              <a:t> </a:t>
+            </a:r>
+            <a:r>
+              <a:rPr lang="en-US" altLang="ja-JP" sz="1200" b="1" dirty="0" smtClean="0">
+                <a:solidFill>
+                  <a:schemeClr val="tx1"/>
+                </a:solidFill>
+              </a:rPr>
+              <a:t>     </a:t>
+            </a:r>
+            <a:r>
+              <a:rPr lang="en-US" altLang="ja-JP" sz="1200" b="1" dirty="0" err="1" smtClean="0">
+                <a:solidFill>
+                  <a:schemeClr val="tx1"/>
+                </a:solidFill>
+              </a:rPr>
+              <a:t>th:value</a:t>
+            </a:r>
+            <a:r>
+              <a:rPr lang="en-US" altLang="ja-JP" sz="1200" b="1" dirty="0" smtClean="0">
+                <a:solidFill>
+                  <a:schemeClr val="tx1"/>
+                </a:solidFill>
+              </a:rPr>
+              <a:t>="${</a:t>
+            </a:r>
+            <a:r>
+              <a:rPr lang="en-US" altLang="ja-JP" sz="1200" b="1" dirty="0" err="1" smtClean="0">
+                <a:solidFill>
+                  <a:schemeClr val="tx1"/>
+                </a:solidFill>
+              </a:rPr>
+              <a:t>month.key</a:t>
+            </a:r>
+            <a:r>
+              <a:rPr lang="en-US" altLang="ja-JP" sz="1200" b="1" dirty="0" smtClean="0">
+                <a:solidFill>
+                  <a:schemeClr val="tx1"/>
+                </a:solidFill>
+              </a:rPr>
+              <a:t>}“ </a:t>
+            </a:r>
+            <a:r>
+              <a:rPr lang="en-US" altLang="ja-JP" sz="1200" b="1" dirty="0" err="1" smtClean="0">
+                <a:solidFill>
+                  <a:schemeClr val="tx1"/>
+                </a:solidFill>
+              </a:rPr>
+              <a:t>th:text</a:t>
+            </a:r>
+            <a:r>
+              <a:rPr lang="en-US" altLang="ja-JP" sz="1200" b="1" dirty="0" smtClean="0">
+                <a:solidFill>
+                  <a:schemeClr val="tx1"/>
+                </a:solidFill>
+              </a:rPr>
+              <a:t>="${</a:t>
+            </a:r>
+            <a:r>
+              <a:rPr lang="en-US" altLang="ja-JP" sz="1200" b="1" dirty="0" err="1" smtClean="0">
+                <a:solidFill>
+                  <a:schemeClr val="tx1"/>
+                </a:solidFill>
+              </a:rPr>
+              <a:t>month</a:t>
+            </a:r>
+            <a:r>
+              <a:rPr lang="en-US" altLang="ja-JP" sz="1200" b="1" dirty="0" err="1" smtClean="0">
+                <a:solidFill>
+                  <a:schemeClr val="tx1"/>
+                </a:solidFill>
+              </a:rPr>
+              <a:t>.value</a:t>
+            </a:r>
+            <a:r>
+              <a:rPr lang="en-US" altLang="ja-JP" sz="1200" b="1" dirty="0" smtClean="0">
+                <a:solidFill>
+                  <a:schemeClr val="tx1"/>
+                </a:solidFill>
+              </a:rPr>
+              <a:t>}"&gt;</a:t>
+            </a:r>
+          </a:p>
+          <a:p>
+            <a:r>
+              <a:rPr lang="en-US" altLang="ja-JP" sz="1200" b="1" dirty="0" smtClean="0">
+                <a:solidFill>
+                  <a:schemeClr val="tx1"/>
+                </a:solidFill>
+              </a:rPr>
+              <a:t>      00</a:t>
+            </a:r>
+          </a:p>
+          <a:p>
+            <a:r>
+              <a:rPr lang="en-US" altLang="ja-JP" sz="1200" b="1" dirty="0">
+                <a:solidFill>
+                  <a:schemeClr val="tx1"/>
+                </a:solidFill>
+              </a:rPr>
+              <a:t> </a:t>
+            </a:r>
+            <a:r>
+              <a:rPr lang="en-US" altLang="ja-JP" sz="1200" b="1" dirty="0" smtClean="0">
+                <a:solidFill>
+                  <a:schemeClr val="tx1"/>
+                </a:solidFill>
+              </a:rPr>
+              <a:t>   &lt;/</a:t>
+            </a:r>
+            <a:r>
+              <a:rPr lang="en-US" altLang="ja-JP" sz="1200" b="1" dirty="0">
+                <a:solidFill>
+                  <a:schemeClr val="tx1"/>
+                </a:solidFill>
+              </a:rPr>
+              <a:t>option&gt;</a:t>
+            </a:r>
+          </a:p>
+          <a:p>
+            <a:r>
+              <a:rPr lang="en-US" altLang="ja-JP" sz="1200" b="1" dirty="0">
+                <a:solidFill>
+                  <a:schemeClr val="tx1"/>
+                </a:solidFill>
+              </a:rPr>
+              <a:t>&lt;/select&gt;</a:t>
             </a:r>
             <a:endParaRPr kumimoji="1" lang="ja-JP" altLang="en-US" sz="1200" b="1" dirty="0">
               <a:solidFill>
@@ -6930,13 +7352,15 @@
       <p:cxnSp>
         <p:nvCxnSpPr>
           <p:cNvPr id="29" name="カギ線コネクタ 28"/>
-          <p:cNvCxnSpPr/>
+          <p:cNvCxnSpPr>
+            <a:endCxn id="20" idx="1"/>
+          </p:cNvCxnSpPr>
           <p:nvPr/>
         </p:nvCxnSpPr>
         <p:spPr>
           <a:xfrm>
             <a:off x="3838576" y="1855471"/>
-            <a:ext cx="1371600" cy="1191725"/>
+            <a:ext cx="1240057" cy="949315"/>
           </a:xfrm>
           <a:prstGeom prst="bentConnector3">
             <a:avLst>
@@ -6973,7 +7397,7 @@
         </p:nvSpPr>
         <p:spPr>
           <a:xfrm>
-            <a:off x="5215731" y="2704361"/>
+            <a:off x="5198273" y="1991679"/>
             <a:ext cx="2562226" cy="182562"/>
           </a:xfrm>
           <a:prstGeom prst="rect">
@@ -7004,12 +7428,12 @@
           <a:lstStyle/>
           <a:p>
             <a:r>
-              <a:rPr kumimoji="1" lang="en-US" altLang="ja-JP" sz="1200" b="1" dirty="0" smtClean="0">
-                <a:solidFill>
-                  <a:schemeClr val="tx1"/>
-                </a:solidFill>
-              </a:rPr>
-              <a:t>JSP</a:t>
+              <a:rPr lang="en-US" altLang="ja-JP" sz="1200" b="1" dirty="0" err="1" smtClean="0">
+                <a:solidFill>
+                  <a:schemeClr val="tx1"/>
+                </a:solidFill>
+              </a:rPr>
+              <a:t>Thymeleaf</a:t>
             </a:r>
             <a:endParaRPr kumimoji="1" lang="ja-JP" altLang="en-US" sz="1200" dirty="0">
               <a:solidFill>
@@ -7030,8 +7454,8 @@
         </p:nvSpPr>
         <p:spPr>
           <a:xfrm rot="16200000" flipH="1">
-            <a:off x="4690453" y="2987389"/>
-            <a:ext cx="1068811" cy="1543843"/>
+            <a:off x="4777534" y="3074470"/>
+            <a:ext cx="894649" cy="1543843"/>
           </a:xfrm>
           <a:prstGeom prst="bentUpArrow">
             <a:avLst/>
@@ -8302,93 +8726,6 @@
           </a:p>
         </p:txBody>
       </p:sp>
-      <p:sp>
-        <p:nvSpPr>
-          <p:cNvPr id="46" name="正方形/長方形 45"/>
-          <p:cNvSpPr/>
-          <p:nvPr/>
-        </p:nvSpPr>
-        <p:spPr>
-          <a:xfrm>
-            <a:off x="5524501" y="4005131"/>
-            <a:ext cx="3510755" cy="855978"/>
-          </a:xfrm>
-          <a:prstGeom prst="rect">
-            <a:avLst/>
-          </a:prstGeom>
-          <a:noFill/>
-          <a:ln>
-            <a:solidFill>
-              <a:schemeClr val="tx1"/>
-            </a:solidFill>
-          </a:ln>
-          <a:effectLst/>
-        </p:spPr>
-        <p:style>
-          <a:lnRef idx="1">
-            <a:schemeClr val="accent1"/>
-          </a:lnRef>
-          <a:fillRef idx="3">
-            <a:schemeClr val="accent1"/>
-          </a:fillRef>
-          <a:effectRef idx="2">
-            <a:schemeClr val="accent1"/>
-          </a:effectRef>
-          <a:fontRef idx="minor">
-            <a:schemeClr val="lt1"/>
-          </a:fontRef>
-        </p:style>
-        <p:txBody>
-          <a:bodyPr rtlCol="0" anchor="ctr"/>
-          <a:lstStyle/>
-          <a:p>
-            <a:r>
-              <a:rPr lang="en-US" altLang="ja-JP" sz="1200" b="1" dirty="0" smtClean="0">
-                <a:solidFill>
-                  <a:schemeClr val="tx1"/>
-                </a:solidFill>
-              </a:rPr>
-              <a:t>&lt;form:select path="orderStatus“&gt;</a:t>
-            </a:r>
-          </a:p>
-          <a:p>
-            <a:r>
-              <a:rPr lang="en-US" altLang="ja-JP" sz="1200" b="1" dirty="0" smtClean="0">
-                <a:solidFill>
-                  <a:schemeClr val="tx1"/>
-                </a:solidFill>
-              </a:rPr>
-              <a:t>    &lt;form:options items="${</a:t>
-            </a:r>
-            <a:r>
-              <a:rPr lang="en-US" altLang="ja-JP" sz="1200" b="1" dirty="0" smtClean="0">
-                <a:solidFill>
-                  <a:schemeClr val="accent1"/>
-                </a:solidFill>
-              </a:rPr>
-              <a:t>CL_ORDERSTATUS</a:t>
-            </a:r>
-            <a:r>
-              <a:rPr lang="en-US" altLang="ja-JP" sz="1200" b="1" dirty="0" smtClean="0">
-                <a:solidFill>
-                  <a:schemeClr val="tx1"/>
-                </a:solidFill>
-              </a:rPr>
-              <a:t>}" /&gt;</a:t>
-            </a:r>
-          </a:p>
-          <a:p>
-            <a:r>
-              <a:rPr lang="en-US" altLang="ja-JP" sz="1200" b="1" dirty="0" smtClean="0">
-                <a:solidFill>
-                  <a:schemeClr val="tx1"/>
-                </a:solidFill>
-              </a:rPr>
-              <a:t>&lt;/form:select&gt;</a:t>
-            </a:r>
-          </a:p>
-        </p:txBody>
-      </p:sp>
       <p:cxnSp>
         <p:nvCxnSpPr>
           <p:cNvPr id="47" name="カギ線コネクタ 46"/>
@@ -8400,7 +8737,7 @@
         <p:spPr>
           <a:xfrm>
             <a:off x="6286500" y="1953633"/>
-            <a:ext cx="1733550" cy="2361192"/>
+            <a:ext cx="1733550" cy="1870501"/>
           </a:xfrm>
           <a:prstGeom prst="bentConnector2">
             <a:avLst/>
@@ -8435,8 +8772,8 @@
         </p:nvSpPr>
         <p:spPr>
           <a:xfrm>
-            <a:off x="5348870" y="3774944"/>
-            <a:ext cx="937630" cy="182562"/>
+            <a:off x="5484310" y="3498209"/>
+            <a:ext cx="1337680" cy="325925"/>
           </a:xfrm>
           <a:prstGeom prst="rect">
             <a:avLst/>
@@ -8466,12 +8803,12 @@
           <a:lstStyle/>
           <a:p>
             <a:r>
-              <a:rPr kumimoji="1" lang="en-US" altLang="ja-JP" sz="1600" b="1" dirty="0" smtClean="0">
-                <a:solidFill>
-                  <a:schemeClr val="tx1"/>
-                </a:solidFill>
-              </a:rPr>
-              <a:t>JSP</a:t>
+              <a:rPr lang="en-US" altLang="ja-JP" sz="1600" b="1" dirty="0" err="1" smtClean="0">
+                <a:solidFill>
+                  <a:schemeClr val="tx1"/>
+                </a:solidFill>
+              </a:rPr>
+              <a:t>Thymeleaf</a:t>
             </a:r>
             <a:endParaRPr kumimoji="1" lang="ja-JP" altLang="en-US" sz="1600" dirty="0">
               <a:solidFill>
@@ -9436,6 +9773,277 @@
           </a:fontRef>
         </p:style>
       </p:cxnSp>
+      <p:sp>
+        <p:nvSpPr>
+          <p:cNvPr id="46" name="正方形/長方形 45"/>
+          <p:cNvSpPr/>
+          <p:nvPr/>
+        </p:nvSpPr>
+        <p:spPr>
+          <a:xfrm>
+            <a:off x="5524501" y="3796559"/>
+            <a:ext cx="3510755" cy="1064550"/>
+          </a:xfrm>
+          <a:prstGeom prst="rect">
+            <a:avLst/>
+          </a:prstGeom>
+          <a:solidFill>
+            <a:schemeClr val="bg1"/>
+          </a:solidFill>
+          <a:ln>
+            <a:solidFill>
+              <a:schemeClr val="tx1"/>
+            </a:solidFill>
+          </a:ln>
+          <a:effectLst/>
+        </p:spPr>
+        <p:style>
+          <a:lnRef idx="1">
+            <a:schemeClr val="accent1"/>
+          </a:lnRef>
+          <a:fillRef idx="3">
+            <a:schemeClr val="accent1"/>
+          </a:fillRef>
+          <a:effectRef idx="2">
+            <a:schemeClr val="accent1"/>
+          </a:effectRef>
+          <a:fontRef idx="minor">
+            <a:schemeClr val="lt1"/>
+          </a:fontRef>
+        </p:style>
+        <p:txBody>
+          <a:bodyPr rtlCol="0" anchor="ctr"/>
+          <a:lstStyle/>
+          <a:p>
+            <a:r>
+              <a:rPr lang="en-US" altLang="ja-JP" sz="1200" b="1" dirty="0">
+                <a:solidFill>
+                  <a:schemeClr val="tx1"/>
+                </a:solidFill>
+              </a:rPr>
+              <a:t>&lt;select </a:t>
+            </a:r>
+            <a:r>
+              <a:rPr lang="en-US" altLang="ja-JP" sz="1200" b="1" dirty="0" err="1">
+                <a:solidFill>
+                  <a:schemeClr val="tx1"/>
+                </a:solidFill>
+              </a:rPr>
+              <a:t>th:field</a:t>
+            </a:r>
+            <a:r>
+              <a:rPr lang="en-US" altLang="ja-JP" sz="1200" b="1" dirty="0">
+                <a:solidFill>
+                  <a:schemeClr val="tx1"/>
+                </a:solidFill>
+              </a:rPr>
+              <a:t>="*{</a:t>
+            </a:r>
+            <a:r>
+              <a:rPr lang="en-US" altLang="ja-JP" sz="1200" b="1" dirty="0" err="1">
+                <a:solidFill>
+                  <a:schemeClr val="tx1"/>
+                </a:solidFill>
+              </a:rPr>
+              <a:t>orderStatus</a:t>
+            </a:r>
+            <a:r>
+              <a:rPr lang="en-US" altLang="ja-JP" sz="1200" b="1" dirty="0">
+                <a:solidFill>
+                  <a:schemeClr val="tx1"/>
+                </a:solidFill>
+              </a:rPr>
+              <a:t>}"&gt;</a:t>
+            </a:r>
+          </a:p>
+          <a:p>
+            <a:r>
+              <a:rPr lang="en-US" altLang="ja-JP" sz="1200" b="1" dirty="0">
+                <a:solidFill>
+                  <a:schemeClr val="tx1"/>
+                </a:solidFill>
+              </a:rPr>
+              <a:t>    &lt;option </a:t>
+            </a:r>
+            <a:r>
+              <a:rPr lang="en-US" altLang="ja-JP" sz="1200" b="1" dirty="0" err="1">
+                <a:solidFill>
+                  <a:schemeClr val="tx1"/>
+                </a:solidFill>
+              </a:rPr>
+              <a:t>th:each</a:t>
+            </a:r>
+            <a:r>
+              <a:rPr lang="en-US" altLang="ja-JP" sz="1200" b="1" dirty="0" smtClean="0">
+                <a:solidFill>
+                  <a:schemeClr val="tx1"/>
+                </a:solidFill>
+              </a:rPr>
+              <a:t>=“</a:t>
+            </a:r>
+            <a:r>
+              <a:rPr lang="en-US" altLang="ja-JP" sz="1200" b="1" dirty="0" smtClean="0">
+                <a:solidFill>
+                  <a:schemeClr val="tx1"/>
+                </a:solidFill>
+              </a:rPr>
+              <a:t>order</a:t>
+            </a:r>
+            <a:r>
+              <a:rPr lang="en-US" altLang="ja-JP" sz="1200" b="1" dirty="0" smtClean="0">
+                <a:solidFill>
+                  <a:schemeClr val="tx1"/>
+                </a:solidFill>
+              </a:rPr>
+              <a:t>  </a:t>
+            </a:r>
+            <a:r>
+              <a:rPr lang="en-US" altLang="ja-JP" sz="1200" b="1" dirty="0">
+                <a:solidFill>
+                  <a:schemeClr val="tx1"/>
+                </a:solidFill>
+              </a:rPr>
+              <a:t>:  </a:t>
+            </a:r>
+            <a:r>
+              <a:rPr lang="en-US" altLang="ja-JP" sz="1200" b="1" dirty="0">
+                <a:solidFill>
+                  <a:srgbClr val="0070C0"/>
+                </a:solidFill>
+              </a:rPr>
+              <a:t>${CL_ORDERSTATUS}“</a:t>
+            </a:r>
+          </a:p>
+          <a:p>
+            <a:r>
+              <a:rPr lang="en-US" altLang="ja-JP" sz="1200" b="1" dirty="0">
+                <a:solidFill>
+                  <a:srgbClr val="0070C0"/>
+                </a:solidFill>
+              </a:rPr>
+              <a:t>     </a:t>
+            </a:r>
+            <a:r>
+              <a:rPr lang="en-US" altLang="ja-JP" sz="1200" b="1" dirty="0">
+                <a:solidFill>
+                  <a:schemeClr val="tx1"/>
+                </a:solidFill>
+              </a:rPr>
+              <a:t> </a:t>
+            </a:r>
+            <a:r>
+              <a:rPr lang="en-US" altLang="ja-JP" sz="1200" b="1" dirty="0" err="1">
+                <a:solidFill>
+                  <a:schemeClr val="tx1"/>
+                </a:solidFill>
+              </a:rPr>
+              <a:t>th:value</a:t>
+            </a:r>
+            <a:r>
+              <a:rPr lang="en-US" altLang="ja-JP" sz="1200" b="1" dirty="0" smtClean="0">
+                <a:solidFill>
+                  <a:schemeClr val="tx1"/>
+                </a:solidFill>
+              </a:rPr>
+              <a:t>="${</a:t>
+            </a:r>
+            <a:r>
+              <a:rPr lang="en-US" altLang="ja-JP" sz="1200" b="1" dirty="0" err="1" smtClean="0">
+                <a:solidFill>
+                  <a:schemeClr val="tx1"/>
+                </a:solidFill>
+              </a:rPr>
+              <a:t>order</a:t>
+            </a:r>
+            <a:r>
+              <a:rPr lang="en-US" altLang="ja-JP" sz="1200" b="1" dirty="0" err="1" smtClean="0">
+                <a:solidFill>
+                  <a:schemeClr val="tx1"/>
+                </a:solidFill>
+              </a:rPr>
+              <a:t>.key</a:t>
+            </a:r>
+            <a:r>
+              <a:rPr lang="en-US" altLang="ja-JP" sz="1200" b="1" dirty="0">
+                <a:solidFill>
+                  <a:schemeClr val="tx1"/>
+                </a:solidFill>
+              </a:rPr>
+              <a:t>}“</a:t>
+            </a:r>
+          </a:p>
+          <a:p>
+            <a:r>
+              <a:rPr lang="en-US" altLang="ja-JP" sz="1200" b="1" dirty="0">
+                <a:solidFill>
+                  <a:schemeClr val="tx1"/>
+                </a:solidFill>
+              </a:rPr>
+              <a:t>      </a:t>
+            </a:r>
+            <a:r>
+              <a:rPr lang="en-US" altLang="ja-JP" sz="1200" b="1" dirty="0" err="1">
+                <a:solidFill>
+                  <a:schemeClr val="tx1"/>
+                </a:solidFill>
+              </a:rPr>
+              <a:t>th:text</a:t>
+            </a:r>
+            <a:r>
+              <a:rPr lang="en-US" altLang="ja-JP" sz="1200" b="1" dirty="0" smtClean="0">
+                <a:solidFill>
+                  <a:schemeClr val="tx1"/>
+                </a:solidFill>
+              </a:rPr>
+              <a:t>="${</a:t>
+            </a:r>
+            <a:r>
+              <a:rPr lang="en-US" altLang="ja-JP" sz="1200" b="1" dirty="0" err="1" smtClean="0">
+                <a:solidFill>
+                  <a:schemeClr val="tx1"/>
+                </a:solidFill>
+              </a:rPr>
+              <a:t>order</a:t>
+            </a:r>
+            <a:r>
+              <a:rPr lang="en-US" altLang="ja-JP" sz="1200" b="1" dirty="0" err="1" smtClean="0">
+                <a:solidFill>
+                  <a:schemeClr val="tx1"/>
+                </a:solidFill>
+              </a:rPr>
+              <a:t>.value</a:t>
+            </a:r>
+            <a:r>
+              <a:rPr lang="en-US" altLang="ja-JP" sz="1200" b="1" dirty="0">
+                <a:solidFill>
+                  <a:schemeClr val="tx1"/>
+                </a:solidFill>
+              </a:rPr>
+              <a:t>}"&gt;Order Status</a:t>
+            </a:r>
+          </a:p>
+          <a:p>
+            <a:r>
+              <a:rPr lang="en-US" altLang="ja-JP" sz="1200" b="1" dirty="0">
+                <a:solidFill>
+                  <a:schemeClr val="tx1"/>
+                </a:solidFill>
+              </a:rPr>
+              <a:t>    &lt;/option&gt;</a:t>
+            </a:r>
+          </a:p>
+          <a:p>
+            <a:r>
+              <a:rPr lang="en-US" altLang="ja-JP" sz="1200" b="1" dirty="0">
+                <a:solidFill>
+                  <a:schemeClr val="tx1"/>
+                </a:solidFill>
+              </a:rPr>
+              <a:t>&lt;/select&gt;</a:t>
+            </a:r>
+          </a:p>
+        </p:txBody>
+      </p:sp>
     </p:spTree>
     <p:extLst>
       <p:ext uri="{BB962C8B-B14F-4D97-AF65-F5344CB8AC3E}">
@@ -9545,7 +10153,15 @@
                   <a:schemeClr val="tx1"/>
                 </a:solidFill>
               </a:rPr>
-              <a:t>  &lt;property name</a:t>
+              <a:t>  &lt;property name="</a:t>
+            </a:r>
+            <a:r>
+              <a:rPr lang="en-US" altLang="ja-JP" sz="1200" b="1" dirty="0" err="1" smtClean="0">
+                <a:solidFill>
+                  <a:schemeClr val="tx1"/>
+                </a:solidFill>
+              </a:rPr>
+              <a:t>jdbcTemplate</a:t>
             </a:r>
             <a:r>
               <a:rPr lang="en-US" sz="1200" b="1" dirty="0" smtClean="0">
@@ -9553,7 +10169,7 @@
                   <a:schemeClr val="tx1"/>
                 </a:solidFill>
               </a:rPr>
-              <a:t>="</a:t>
+              <a:t>" ref="</a:t>
             </a:r>
             <a:r>
               <a:rPr lang="en-US" altLang="ja-JP" sz="1200" b="1" dirty="0" err="1" smtClean="0">
@@ -9561,39 +10177,7 @@
                   <a:schemeClr val="tx1"/>
                 </a:solidFill>
               </a:rPr>
-              <a:t>jdbcTemplate</a:t>
-            </a:r>
-            <a:r>
-              <a:rPr lang="en-US" sz="1200" b="1" dirty="0" smtClean="0">
-                <a:solidFill>
-                  <a:schemeClr val="tx1"/>
-                </a:solidFill>
-              </a:rPr>
-              <a:t>" ref</a:t>
-            </a:r>
-            <a:r>
-              <a:rPr lang="en-US" sz="1200" b="1" dirty="0" smtClean="0">
-                <a:solidFill>
-                  <a:schemeClr val="tx1"/>
-                </a:solidFill>
-              </a:rPr>
-              <a:t>="</a:t>
-            </a:r>
-            <a:r>
-              <a:rPr lang="en-US" altLang="ja-JP" sz="1200" b="1" dirty="0" err="1" smtClean="0">
-                <a:solidFill>
-                  <a:schemeClr val="tx1"/>
-                </a:solidFill>
-              </a:rPr>
-              <a:t>jdbc</a:t>
-            </a:r>
-            <a:r>
-              <a:rPr lang="en-US" altLang="ja-JP" sz="1200" b="1" dirty="0" err="1" smtClean="0">
-                <a:solidFill>
-                  <a:schemeClr val="tx1"/>
-                </a:solidFill>
-              </a:rPr>
-              <a:t>TemplateForCodeList</a:t>
+              <a:t>jdbcTemplateForCodeList</a:t>
             </a:r>
             <a:r>
               <a:rPr lang="en-US" sz="1200" b="1" dirty="0" smtClean="0">
@@ -10079,16 +10663,32 @@
                   <a:schemeClr val="tx1"/>
                 </a:solidFill>
               </a:rPr>
-              <a:t>  &lt;input id="authorities1" name="authorities" type="checkbox" value="01"/&gt;</a:t>
-            </a:r>
-          </a:p>
-          <a:p>
+              <a:t>  &lt;input type="checkbox" value="01"</a:t>
+            </a:r>
+            <a:r>
+              <a:rPr lang="en-US" altLang="ja-JP" sz="1200" b="1" dirty="0">
+                <a:solidFill>
+                  <a:schemeClr val="tx1"/>
+                </a:solidFill>
+              </a:rPr>
+              <a:t> id="authorities1" name="authorities" </a:t>
+            </a:r>
             <a:r>
               <a:rPr lang="en-US" sz="1200" b="1" dirty="0" smtClean="0">
                 <a:solidFill>
                   <a:schemeClr val="tx1"/>
                 </a:solidFill>
               </a:rPr>
+              <a:t>/&gt;</a:t>
+            </a:r>
+          </a:p>
+          <a:p>
+            <a:r>
+              <a:rPr lang="en-US" sz="1200" b="1" dirty="0" smtClean="0">
+                <a:solidFill>
+                  <a:schemeClr val="tx1"/>
+                </a:solidFill>
+              </a:rPr>
               <a:t>  &lt;label for="authorities1"&gt;STAFF_MANAGEMENT&lt;/label&gt;</a:t>
             </a:r>
           </a:p>
@@ -10129,7 +10729,23 @@
                   <a:schemeClr val="tx1"/>
                 </a:solidFill>
               </a:rPr>
-              <a:t>  &lt;input id="authorities5" name="authorities" type="checkbox" value="05"/&gt;</a:t>
+              <a:t>  &lt;input type="checkbox" value="05"</a:t>
+            </a:r>
+            <a:r>
+              <a:rPr lang="en-US" altLang="ja-JP" sz="1200" b="1" dirty="0">
+                <a:solidFill>
+                  <a:schemeClr val="tx1"/>
+                </a:solidFill>
+              </a:rPr>
+              <a:t> id="authorities5" name="authorities" </a:t>
+            </a:r>
+            <a:r>
+              <a:rPr lang="en-US" sz="1200" b="1" dirty="0" smtClean="0">
+                <a:solidFill>
+                  <a:schemeClr val="tx1"/>
+                </a:solidFill>
+              </a:rPr>
+              <a:t>/&gt;</a:t>
             </a:r>
           </a:p>
           <a:p>
@@ -10573,62 +11189,6 @@
           </a:fontRef>
         </p:style>
       </p:cxnSp>
-      <p:sp>
-        <p:nvSpPr>
-          <p:cNvPr id="20" name="正方形/長方形 19"/>
-          <p:cNvSpPr/>
-          <p:nvPr/>
-        </p:nvSpPr>
-        <p:spPr>
-          <a:xfrm>
-            <a:off x="5645326" y="3304760"/>
-            <a:ext cx="3409114" cy="337982"/>
-          </a:xfrm>
-          <a:prstGeom prst="rect">
-            <a:avLst/>
-          </a:prstGeom>
-          <a:noFill/>
-          <a:ln>
-            <a:solidFill>
-              <a:schemeClr val="tx1"/>
-            </a:solidFill>
-          </a:ln>
-          <a:effectLst/>
-        </p:spPr>
-        <p:style>
-          <a:lnRef idx="1">
-            <a:schemeClr val="accent1"/>
-          </a:lnRef>
-          <a:fillRef idx="3">
-            <a:schemeClr val="accent1"/>
-          </a:fillRef>
-          <a:effectRef idx="2">
-            <a:schemeClr val="accent1"/>
-          </a:effectRef>
-          <a:fontRef idx="minor">
-            <a:schemeClr val="lt1"/>
-          </a:fontRef>
-        </p:style>
-        <p:txBody>
-          <a:bodyPr rtlCol="0" anchor="ctr"/>
-          <a:lstStyle/>
-          <a:p>
-            <a:r>
-              <a:rPr lang="en-US" altLang="ja-JP" sz="1200" b="1" dirty="0" smtClean="0">
-                <a:solidFill>
-                  <a:schemeClr val="tx1"/>
-                </a:solidFill>
-              </a:rPr>
-              <a:t>&lt;form:checkboxes items="${CL_AUTHORITIES}"/&gt;</a:t>
-            </a:r>
-            <a:endParaRPr kumimoji="1" lang="ja-JP" altLang="en-US" sz="1200" b="1" dirty="0">
-              <a:solidFill>
-                <a:schemeClr val="tx1"/>
-              </a:solidFill>
-            </a:endParaRPr>
-          </a:p>
-        </p:txBody>
-      </p:sp>
       <p:cxnSp>
         <p:nvCxnSpPr>
           <p:cNvPr id="21" name="直線矢印コネクタ 20"/>
@@ -10919,19 +11479,17 @@
       <p:cxnSp>
         <p:nvCxnSpPr>
           <p:cNvPr id="29" name="カギ線コネクタ 28"/>
-          <p:cNvCxnSpPr>
-            <a:endCxn id="30" idx="1"/>
-          </p:cNvCxnSpPr>
+          <p:cNvCxnSpPr/>
           <p:nvPr/>
         </p:nvCxnSpPr>
         <p:spPr>
           <a:xfrm>
-            <a:off x="3631692" y="2257648"/>
-            <a:ext cx="2206567" cy="955831"/>
+            <a:off x="2753676" y="2345735"/>
+            <a:ext cx="4343401" cy="515115"/>
           </a:xfrm>
           <a:prstGeom prst="bentConnector3">
             <a:avLst>
-              <a:gd name="adj1" fmla="val 86692"/>
+              <a:gd name="adj1" fmla="val 100064"/>
             </a:avLst>
           </a:prstGeom>
           <a:ln>
@@ -10964,7 +11522,7 @@
         </p:nvSpPr>
         <p:spPr>
           <a:xfrm>
-            <a:off x="5838259" y="3122198"/>
+            <a:off x="5041411" y="2552414"/>
             <a:ext cx="2562226" cy="182562"/>
           </a:xfrm>
           <a:prstGeom prst="rect">
@@ -10995,12 +11553,12 @@
           <a:lstStyle/>
           <a:p>
             <a:r>
-              <a:rPr kumimoji="1" lang="en-US" altLang="ja-JP" sz="1200" b="1" dirty="0" smtClean="0">
-                <a:solidFill>
-                  <a:schemeClr val="tx1"/>
-                </a:solidFill>
-              </a:rPr>
-              <a:t>JSP</a:t>
+              <a:rPr kumimoji="1" lang="en-US" altLang="ja-JP" sz="1200" b="1" dirty="0" err="1" smtClean="0">
+                <a:solidFill>
+                  <a:schemeClr val="tx1"/>
+                </a:solidFill>
+              </a:rPr>
+              <a:t>Thymeleaf</a:t>
             </a:r>
             <a:endParaRPr kumimoji="1" lang="ja-JP" altLang="en-US" sz="1200" dirty="0">
               <a:solidFill>
@@ -11021,7 +11579,7 @@
         </p:nvSpPr>
         <p:spPr>
           <a:xfrm rot="16200000" flipH="1">
-            <a:off x="5934042" y="3405226"/>
+            <a:off x="5934042" y="3479583"/>
             <a:ext cx="1068811" cy="1543843"/>
           </a:xfrm>
           <a:prstGeom prst="bentUpArrow">
@@ -12003,6 +12561,267 @@
           </a:fontRef>
         </p:style>
       </p:cxnSp>
+      <p:sp>
+        <p:nvSpPr>
+          <p:cNvPr id="20" name="正方形/長方形 19"/>
+          <p:cNvSpPr/>
+          <p:nvPr/>
+        </p:nvSpPr>
+        <p:spPr>
+          <a:xfrm>
+            <a:off x="5041411" y="2817036"/>
+            <a:ext cx="3739876" cy="1064870"/>
+          </a:xfrm>
+          <a:prstGeom prst="rect">
+            <a:avLst/>
+          </a:prstGeom>
+          <a:solidFill>
+            <a:schemeClr val="bg1"/>
+          </a:solidFill>
+          <a:ln>
+            <a:solidFill>
+              <a:schemeClr val="tx1"/>
+            </a:solidFill>
+          </a:ln>
+          <a:effectLst/>
+        </p:spPr>
+        <p:style>
+          <a:lnRef idx="1">
+            <a:schemeClr val="accent1"/>
+          </a:lnRef>
+          <a:fillRef idx="3">
+            <a:schemeClr val="accent1"/>
+          </a:fillRef>
+          <a:effectRef idx="2">
+            <a:schemeClr val="accent1"/>
+          </a:effectRef>
+          <a:fontRef idx="minor">
+            <a:schemeClr val="lt1"/>
+          </a:fontRef>
+        </p:style>
+        <p:txBody>
+          <a:bodyPr rtlCol="0" anchor="ctr"/>
+          <a:lstStyle/>
+          <a:p>
+            <a:r>
+              <a:rPr lang="en-US" altLang="ja-JP" sz="1200" b="1" dirty="0">
+                <a:solidFill>
+                  <a:schemeClr val="tx1"/>
+                </a:solidFill>
+              </a:rPr>
+              <a:t>&lt;span </a:t>
+            </a:r>
+            <a:r>
+              <a:rPr lang="en-US" altLang="ja-JP" sz="1200" b="1" dirty="0" err="1">
+                <a:solidFill>
+                  <a:schemeClr val="tx1"/>
+                </a:solidFill>
+              </a:rPr>
+              <a:t>th:each</a:t>
+            </a:r>
+            <a:r>
+              <a:rPr lang="en-US" altLang="ja-JP" sz="1200" b="1" dirty="0">
+                <a:solidFill>
+                  <a:schemeClr val="tx1"/>
+                </a:solidFill>
+              </a:rPr>
+              <a:t>=" authority </a:t>
+            </a:r>
+            <a:r>
+              <a:rPr lang="en-US" altLang="ja-JP" sz="1200" b="1" dirty="0">
+                <a:solidFill>
+                  <a:schemeClr val="tx1"/>
+                </a:solidFill>
+              </a:rPr>
+              <a:t>: </a:t>
+            </a:r>
+            <a:r>
+              <a:rPr lang="en-US" altLang="ja-JP" sz="1200" b="1" dirty="0" smtClean="0">
+                <a:solidFill>
+                  <a:schemeClr val="tx1"/>
+                </a:solidFill>
+              </a:rPr>
+              <a:t>${</a:t>
+            </a:r>
+            <a:r>
+              <a:rPr lang="en-US" altLang="ja-JP" sz="1200" b="1" dirty="0" smtClean="0">
+                <a:solidFill>
+                  <a:srgbClr val="0070C0"/>
+                </a:solidFill>
+              </a:rPr>
+              <a:t>CL_AUTHORITIES</a:t>
+            </a:r>
+            <a:r>
+              <a:rPr lang="en-US" altLang="ja-JP" sz="1200" b="1" dirty="0" smtClean="0">
+                <a:solidFill>
+                  <a:schemeClr val="tx1"/>
+                </a:solidFill>
+              </a:rPr>
+              <a:t>}"&gt;</a:t>
+            </a:r>
+            <a:endParaRPr lang="en-US" altLang="ja-JP" sz="1200" b="1" dirty="0">
+              <a:solidFill>
+                <a:schemeClr val="tx1"/>
+              </a:solidFill>
+            </a:endParaRPr>
+          </a:p>
+          <a:p>
+            <a:r>
+              <a:rPr lang="en-US" altLang="ja-JP" sz="1200" b="1" dirty="0" smtClean="0">
+                <a:solidFill>
+                  <a:schemeClr val="tx1"/>
+                </a:solidFill>
+              </a:rPr>
+              <a:t>  &lt;</a:t>
+            </a:r>
+            <a:r>
+              <a:rPr lang="en-US" altLang="ja-JP" sz="1200" b="1" dirty="0">
+                <a:solidFill>
+                  <a:schemeClr val="tx1"/>
+                </a:solidFill>
+              </a:rPr>
+              <a:t>input type="checkbox" </a:t>
+            </a:r>
+            <a:r>
+              <a:rPr lang="en-US" altLang="ja-JP" sz="1200" b="1" dirty="0" err="1">
+                <a:solidFill>
+                  <a:schemeClr val="tx1"/>
+                </a:solidFill>
+              </a:rPr>
+              <a:t>th:field</a:t>
+            </a:r>
+            <a:r>
+              <a:rPr lang="en-US" altLang="ja-JP" sz="1200" b="1" dirty="0">
+                <a:solidFill>
+                  <a:schemeClr val="tx1"/>
+                </a:solidFill>
+              </a:rPr>
+              <a:t>="*{authorities}" </a:t>
+            </a:r>
+            <a:r>
+              <a:rPr lang="en-US" altLang="ja-JP" sz="1200" b="1" dirty="0" err="1">
+                <a:solidFill>
+                  <a:schemeClr val="tx1"/>
+                </a:solidFill>
+              </a:rPr>
+              <a:t>th:value</a:t>
+            </a:r>
+            <a:r>
+              <a:rPr lang="en-US" altLang="ja-JP" sz="1200" b="1" dirty="0">
+                <a:solidFill>
+                  <a:schemeClr val="tx1"/>
+                </a:solidFill>
+              </a:rPr>
+              <a:t>="${</a:t>
+            </a:r>
+            <a:r>
+              <a:rPr lang="en-US" altLang="ja-JP" sz="1200" b="1" dirty="0" err="1">
+                <a:solidFill>
+                  <a:schemeClr val="tx1"/>
+                </a:solidFill>
+              </a:rPr>
+              <a:t>authority.key</a:t>
+            </a:r>
+            <a:r>
+              <a:rPr lang="en-US" altLang="ja-JP" sz="1200" b="1" dirty="0">
+                <a:solidFill>
+                  <a:schemeClr val="tx1"/>
+                </a:solidFill>
+              </a:rPr>
+              <a:t>}" /&gt;</a:t>
+            </a:r>
+          </a:p>
+          <a:p>
+            <a:r>
+              <a:rPr lang="en-US" altLang="ja-JP" sz="1200" b="1" dirty="0">
+                <a:solidFill>
+                  <a:schemeClr val="tx1"/>
+                </a:solidFill>
+              </a:rPr>
+              <a:t>  &lt;label </a:t>
+            </a:r>
+            <a:r>
+              <a:rPr lang="en-US" altLang="ja-JP" sz="1200" b="1" dirty="0" err="1">
+                <a:solidFill>
+                  <a:schemeClr val="tx1"/>
+                </a:solidFill>
+              </a:rPr>
+              <a:t>th:for</a:t>
+            </a:r>
+            <a:r>
+              <a:rPr lang="en-US" altLang="ja-JP" sz="1200" b="1" dirty="0">
+                <a:solidFill>
+                  <a:schemeClr val="tx1"/>
+                </a:solidFill>
+              </a:rPr>
+              <a:t>="${#</a:t>
+            </a:r>
+            <a:r>
+              <a:rPr lang="en-US" altLang="ja-JP" sz="1200" b="1" dirty="0" err="1">
+                <a:solidFill>
+                  <a:schemeClr val="tx1"/>
+                </a:solidFill>
+              </a:rPr>
+              <a:t>ids.prev</a:t>
+            </a:r>
+            <a:r>
+              <a:rPr lang="en-US" altLang="ja-JP" sz="1200" b="1" dirty="0">
+                <a:solidFill>
+                  <a:schemeClr val="tx1"/>
+                </a:solidFill>
+              </a:rPr>
+              <a:t>('authorities')}" </a:t>
+            </a:r>
+            <a:r>
+              <a:rPr lang="en-US" altLang="ja-JP" sz="1200" b="1" dirty="0" err="1">
+                <a:solidFill>
+                  <a:schemeClr val="tx1"/>
+                </a:solidFill>
+              </a:rPr>
+              <a:t>th:text</a:t>
+            </a:r>
+            <a:r>
+              <a:rPr lang="en-US" altLang="ja-JP" sz="1200" b="1" dirty="0">
+                <a:solidFill>
+                  <a:schemeClr val="tx1"/>
+                </a:solidFill>
+              </a:rPr>
+              <a:t>="${</a:t>
+            </a:r>
+            <a:r>
+              <a:rPr lang="en-US" altLang="ja-JP" sz="1200" b="1" dirty="0" err="1">
+                <a:solidFill>
+                  <a:schemeClr val="tx1"/>
+                </a:solidFill>
+              </a:rPr>
+              <a:t>authority.value</a:t>
+            </a:r>
+            <a:r>
+              <a:rPr lang="en-US" altLang="ja-JP" sz="1200" b="1" dirty="0">
+                <a:solidFill>
+                  <a:schemeClr val="tx1"/>
+                </a:solidFill>
+              </a:rPr>
+              <a:t>}"&gt;dummy label&lt;/label&gt;</a:t>
+            </a:r>
+          </a:p>
+          <a:p>
+            <a:r>
+              <a:rPr lang="en-US" altLang="ja-JP" sz="1200" b="1" dirty="0">
+                <a:solidFill>
+                  <a:schemeClr val="tx1"/>
+                </a:solidFill>
+              </a:rPr>
+              <a:t>&lt;/span&gt;</a:t>
+            </a:r>
+            <a:endParaRPr kumimoji="1" lang="ja-JP" altLang="en-US" sz="1200" b="1" dirty="0">
+              <a:solidFill>
+                <a:schemeClr val="tx1"/>
+              </a:solidFill>
+            </a:endParaRPr>
+          </a:p>
+        </p:txBody>
+      </p:sp>
     </p:spTree>
   </p:cSld>
   <p:clrMapOvr>
@@ -13034,70 +13853,6 @@
           </a:fontRef>
         </p:style>
       </p:cxnSp>
-      <p:sp>
-        <p:nvSpPr>
-          <p:cNvPr id="25" name="正方形/長方形 24"/>
-          <p:cNvSpPr/>
-          <p:nvPr/>
-        </p:nvSpPr>
-        <p:spPr>
-          <a:xfrm>
-            <a:off x="4732799" y="3997888"/>
-            <a:ext cx="4174201" cy="337982"/>
-          </a:xfrm>
-          <a:prstGeom prst="rect">
-            <a:avLst/>
-          </a:prstGeom>
-          <a:noFill/>
-          <a:ln>
-            <a:solidFill>
-              <a:schemeClr val="tx1"/>
-            </a:solidFill>
-          </a:ln>
-          <a:effectLst/>
-        </p:spPr>
-        <p:style>
-          <a:lnRef idx="1">
-            <a:schemeClr val="accent1"/>
-          </a:lnRef>
-          <a:fillRef idx="3">
-            <a:schemeClr val="accent1"/>
-          </a:fillRef>
-          <a:effectRef idx="2">
-            <a:schemeClr val="accent1"/>
-          </a:effectRef>
-          <a:fontRef idx="minor">
-            <a:schemeClr val="lt1"/>
-          </a:fontRef>
-        </p:style>
-        <p:txBody>
-          <a:bodyPr rtlCol="0" anchor="ctr"/>
-          <a:lstStyle/>
-          <a:p>
-            <a:r>
-              <a:rPr lang="en-US" altLang="ja-JP" sz="1200" b="1" dirty="0" smtClean="0">
-                <a:solidFill>
-                  <a:schemeClr val="tx1"/>
-                </a:solidFill>
-              </a:rPr>
-              <a:t>&lt;form:select path=</a:t>
-            </a:r>
-            <a:r>
-              <a:rPr lang="en-US" altLang="ja-JP" sz="1200" b="1" i="1" dirty="0" smtClean="0">
-                <a:solidFill>
-                  <a:schemeClr val="tx1"/>
-                </a:solidFill>
-              </a:rPr>
-              <a:t>"basePrice" items="${CL_BASE_PRICE}" /&gt;</a:t>
-            </a:r>
-            <a:endParaRPr kumimoji="1" lang="ja-JP" altLang="en-US" sz="1200" b="1" dirty="0">
-              <a:solidFill>
-                <a:schemeClr val="tx1"/>
-              </a:solidFill>
-            </a:endParaRPr>
-          </a:p>
-        </p:txBody>
-      </p:sp>
       <p:cxnSp>
         <p:nvCxnSpPr>
           <p:cNvPr id="27" name="図形 26"/>
@@ -13109,12 +13864,12 @@
         </p:nvCxnSpPr>
         <p:spPr>
           <a:xfrm rot="16200000" flipH="1">
-            <a:off x="4340098" y="529537"/>
-            <a:ext cx="953372" cy="5618206"/>
+            <a:off x="4363292" y="506343"/>
+            <a:ext cx="928396" cy="5639619"/>
           </a:xfrm>
           <a:prstGeom prst="bentConnector3">
             <a:avLst>
-              <a:gd name="adj1" fmla="val -10990"/>
+              <a:gd name="adj1" fmla="val -24623"/>
             </a:avLst>
           </a:prstGeom>
           <a:ln>
@@ -13144,8 +13899,8 @@
         </p:nvSpPr>
         <p:spPr>
           <a:xfrm>
-            <a:off x="6344774" y="3815326"/>
-            <a:ext cx="2562226" cy="182562"/>
+            <a:off x="7146419" y="3790350"/>
+            <a:ext cx="1001761" cy="145003"/>
           </a:xfrm>
           <a:prstGeom prst="rect">
             <a:avLst/>
@@ -13175,12 +13930,12 @@
           <a:lstStyle/>
           <a:p>
             <a:r>
-              <a:rPr kumimoji="1" lang="en-US" altLang="ja-JP" sz="1200" b="1" dirty="0" smtClean="0">
-                <a:solidFill>
-                  <a:schemeClr val="tx1"/>
-                </a:solidFill>
-              </a:rPr>
-              <a:t>                               JSP</a:t>
+              <a:rPr kumimoji="1" lang="en-US" altLang="ja-JP" sz="1200" b="1" dirty="0" err="1" smtClean="0">
+                <a:solidFill>
+                  <a:schemeClr val="tx1"/>
+                </a:solidFill>
+              </a:rPr>
+              <a:t>Thymeleaf</a:t>
             </a:r>
             <a:endParaRPr kumimoji="1" lang="ja-JP" altLang="en-US" sz="1200" dirty="0">
               <a:solidFill>
@@ -13201,8 +13956,8 @@
         </p:nvSpPr>
         <p:spPr>
           <a:xfrm>
-            <a:off x="542924" y="4597344"/>
-            <a:ext cx="5314951" cy="1004635"/>
+            <a:off x="542925" y="4597344"/>
+            <a:ext cx="4062530" cy="1004635"/>
           </a:xfrm>
           <a:prstGeom prst="rect">
             <a:avLst/>
@@ -13365,7 +14120,7 @@
         <p:spPr>
           <a:xfrm>
             <a:off x="542924" y="5807019"/>
-            <a:ext cx="5314951" cy="1004635"/>
+            <a:ext cx="4062531" cy="1004635"/>
           </a:xfrm>
           <a:prstGeom prst="rect">
             <a:avLst/>
@@ -13572,12 +14327,12 @@
         </p:nvCxnSpPr>
         <p:spPr>
           <a:xfrm rot="10800000" flipV="1">
-            <a:off x="542926" y="4290827"/>
-            <a:ext cx="4189877" cy="215235"/>
+            <a:off x="542926" y="4304799"/>
+            <a:ext cx="5308075" cy="201263"/>
           </a:xfrm>
           <a:prstGeom prst="bentConnector3">
             <a:avLst>
-              <a:gd name="adj1" fmla="val 104774"/>
+              <a:gd name="adj1" fmla="val 104307"/>
             </a:avLst>
           </a:prstGeom>
           <a:ln>
@@ -13609,12 +14364,12 @@
         </p:nvCxnSpPr>
         <p:spPr>
           <a:xfrm rot="10800000" flipV="1">
-            <a:off x="542925" y="4093138"/>
-            <a:ext cx="4189881" cy="1622600"/>
+            <a:off x="542925" y="4116206"/>
+            <a:ext cx="5311823" cy="1599532"/>
           </a:xfrm>
           <a:prstGeom prst="bentConnector3">
             <a:avLst>
-              <a:gd name="adj1" fmla="val 107502"/>
+              <a:gd name="adj1" fmla="val 104304"/>
             </a:avLst>
           </a:prstGeom>
           <a:ln>
@@ -13641,13 +14396,14 @@
           <p:cNvPr id="68" name="直線矢印コネクタ 67"/>
           <p:cNvCxnSpPr>
             <a:stCxn id="38" idx="3"/>
+            <a:endCxn id="2" idx="1"/>
           </p:cNvCxnSpPr>
           <p:nvPr/>
         </p:nvCxnSpPr>
         <p:spPr>
-          <a:xfrm>
-            <a:off x="5857875" y="5099662"/>
-            <a:ext cx="1562100" cy="0"/>
+          <a:xfrm flipV="1">
+            <a:off x="4605455" y="5094092"/>
+            <a:ext cx="285929" cy="5570"/>
           </a:xfrm>
           <a:prstGeom prst="straightConnector1">
             <a:avLst/>
@@ -13679,7 +14435,7 @@
         </p:nvSpPr>
         <p:spPr>
           <a:xfrm>
-            <a:off x="6582898" y="4528162"/>
+            <a:off x="4546555" y="4379622"/>
             <a:ext cx="2085977" cy="182562"/>
           </a:xfrm>
           <a:prstGeom prst="rect">
@@ -13745,8 +14501,8 @@
         </p:blipFill>
         <p:spPr bwMode="auto">
           <a:xfrm>
-            <a:off x="7419975" y="5678179"/>
-            <a:ext cx="1009650" cy="1143000"/>
+            <a:off x="4931775" y="5796826"/>
+            <a:ext cx="919225" cy="1040632"/>
           </a:xfrm>
           <a:prstGeom prst="rect">
             <a:avLst/>
@@ -13768,7 +14524,7 @@
         </p:nvSpPr>
         <p:spPr>
           <a:xfrm>
-            <a:off x="6644262" y="5678179"/>
+            <a:off x="4606603" y="5586898"/>
             <a:ext cx="2085977" cy="182562"/>
           </a:xfrm>
           <a:prstGeom prst="rect">
@@ -13822,13 +14578,14 @@
           <p:cNvPr id="73" name="直線矢印コネクタ 72"/>
           <p:cNvCxnSpPr>
             <a:stCxn id="45" idx="3"/>
+            <a:endCxn id="1027" idx="1"/>
           </p:cNvCxnSpPr>
           <p:nvPr/>
         </p:nvCxnSpPr>
         <p:spPr>
           <a:xfrm>
-            <a:off x="5857875" y="6309337"/>
-            <a:ext cx="1562100" cy="0"/>
+            <a:off x="4605455" y="6309337"/>
+            <a:ext cx="326320" cy="7805"/>
           </a:xfrm>
           <a:prstGeom prst="straightConnector1">
             <a:avLst/>
@@ -14040,8 +14797,8 @@
         </p:blipFill>
         <p:spPr bwMode="auto">
           <a:xfrm>
-            <a:off x="7419975" y="4506063"/>
-            <a:ext cx="1343025" cy="1095375"/>
+            <a:off x="4891384" y="4686287"/>
+            <a:ext cx="1000008" cy="815609"/>
           </a:xfrm>
           <a:prstGeom prst="rect">
             <a:avLst/>
@@ -14049,6 +14806,351 @@
           <a:noFill/>
         </p:spPr>
       </p:pic>
+      <p:sp>
+        <p:nvSpPr>
+          <p:cNvPr id="30" name="正方形/長方形 29"/>
+          <p:cNvSpPr/>
+          <p:nvPr/>
+        </p:nvSpPr>
+        <p:spPr>
+          <a:xfrm>
+            <a:off x="5854747" y="3960778"/>
+            <a:ext cx="3202756" cy="1282557"/>
+          </a:xfrm>
+          <a:prstGeom prst="rect">
+            <a:avLst/>
+          </a:prstGeom>
+          <a:noFill/>
+          <a:ln>
+            <a:solidFill>
+              <a:schemeClr val="tx1"/>
+            </a:solidFill>
+          </a:ln>
+          <a:effectLst/>
+        </p:spPr>
+        <p:style>
+          <a:lnRef idx="1">
+            <a:schemeClr val="accent1"/>
+          </a:lnRef>
+          <a:fillRef idx="3">
+            <a:schemeClr val="accent1"/>
+          </a:fillRef>
+          <a:effectRef idx="2">
+            <a:schemeClr val="accent1"/>
+          </a:effectRef>
+          <a:fontRef idx="minor">
+            <a:schemeClr val="lt1"/>
+          </a:fontRef>
+        </p:style>
+        <p:txBody>
+          <a:bodyPr rtlCol="0" anchor="ctr"/>
+          <a:lstStyle/>
+          <a:p>
+            <a:r>
+              <a:rPr lang="en-US" altLang="ja-JP" sz="1200" b="1" dirty="0">
+                <a:solidFill>
+                  <a:schemeClr val="tx1"/>
+                </a:solidFill>
+              </a:rPr>
+              <a:t>&lt;select </a:t>
+            </a:r>
+            <a:r>
+              <a:rPr lang="en-US" altLang="ja-JP" sz="1200" b="1" dirty="0" err="1">
+                <a:solidFill>
+                  <a:schemeClr val="tx1"/>
+                </a:solidFill>
+              </a:rPr>
+              <a:t>th:field</a:t>
+            </a:r>
+            <a:r>
+              <a:rPr lang="en-US" altLang="ja-JP" sz="1200" b="1" dirty="0" smtClean="0">
+                <a:solidFill>
+                  <a:schemeClr val="tx1"/>
+                </a:solidFill>
+              </a:rPr>
+              <a:t>=“*{</a:t>
+            </a:r>
+            <a:r>
+              <a:rPr lang="en-US" altLang="ja-JP" sz="1200" b="1" dirty="0" err="1" smtClean="0">
+                <a:solidFill>
+                  <a:schemeClr val="tx1"/>
+                </a:solidFill>
+              </a:rPr>
+              <a:t>basePrice</a:t>
+            </a:r>
+            <a:r>
+              <a:rPr lang="en-US" altLang="ja-JP" sz="1200" b="1" dirty="0" smtClean="0">
+                <a:solidFill>
+                  <a:schemeClr val="tx1"/>
+                </a:solidFill>
+              </a:rPr>
+              <a:t>}"&gt;</a:t>
+            </a:r>
+          </a:p>
+          <a:p>
+            <a:r>
+              <a:rPr lang="en-US" altLang="ja-JP" sz="1200" b="1" dirty="0">
+                <a:solidFill>
+                  <a:schemeClr val="tx1"/>
+                </a:solidFill>
+              </a:rPr>
+              <a:t>    &lt;option </a:t>
+            </a:r>
+            <a:r>
+              <a:rPr lang="en-US" altLang="ja-JP" sz="1200" b="1" dirty="0" err="1">
+                <a:solidFill>
+                  <a:schemeClr val="tx1"/>
+                </a:solidFill>
+              </a:rPr>
+              <a:t>th:each</a:t>
+            </a:r>
+            <a:r>
+              <a:rPr lang="en-US" altLang="ja-JP" sz="1200" b="1" dirty="0" smtClean="0">
+                <a:solidFill>
+                  <a:schemeClr val="tx1"/>
+                </a:solidFill>
+              </a:rPr>
+              <a:t>=“</a:t>
+            </a:r>
+            <a:r>
+              <a:rPr lang="en-US" altLang="ja-JP" sz="1200" b="1" dirty="0" smtClean="0">
+                <a:solidFill>
+                  <a:schemeClr val="tx1"/>
+                </a:solidFill>
+              </a:rPr>
+              <a:t>price</a:t>
+            </a:r>
+            <a:r>
+              <a:rPr lang="en-US" altLang="ja-JP" sz="1200" b="1" dirty="0" smtClean="0">
+                <a:solidFill>
+                  <a:schemeClr val="tx1"/>
+                </a:solidFill>
+              </a:rPr>
+              <a:t>  </a:t>
+            </a:r>
+            <a:r>
+              <a:rPr lang="en-US" altLang="ja-JP" sz="1200" b="1" dirty="0" smtClean="0">
+                <a:solidFill>
+                  <a:schemeClr val="tx1"/>
+                </a:solidFill>
+              </a:rPr>
+              <a:t>:  </a:t>
+            </a:r>
+            <a:r>
+              <a:rPr lang="en-US" altLang="ja-JP" sz="1200" b="1" dirty="0">
+                <a:solidFill>
+                  <a:srgbClr val="0070C0"/>
+                </a:solidFill>
+              </a:rPr>
+              <a:t>${CL_BASE_PRICE</a:t>
+            </a:r>
+            <a:r>
+              <a:rPr lang="en-US" altLang="ja-JP" sz="1200" b="1" dirty="0" smtClean="0">
+                <a:solidFill>
+                  <a:srgbClr val="0070C0"/>
+                </a:solidFill>
+              </a:rPr>
+              <a:t>}“</a:t>
+            </a:r>
+            <a:endParaRPr lang="en-US" altLang="ja-JP" sz="1200" b="1" dirty="0" smtClean="0">
+              <a:solidFill>
+                <a:srgbClr val="0070C0"/>
+              </a:solidFill>
+            </a:endParaRPr>
+          </a:p>
+          <a:p>
+            <a:r>
+              <a:rPr lang="en-US" altLang="ja-JP" sz="1200" b="1" dirty="0">
+                <a:solidFill>
+                  <a:srgbClr val="0070C0"/>
+                </a:solidFill>
+              </a:rPr>
+              <a:t> </a:t>
+            </a:r>
+            <a:r>
+              <a:rPr lang="en-US" altLang="ja-JP" sz="1200" b="1" dirty="0" smtClean="0">
+                <a:solidFill>
+                  <a:srgbClr val="0070C0"/>
+                </a:solidFill>
+              </a:rPr>
+              <a:t>    </a:t>
+            </a:r>
+            <a:r>
+              <a:rPr lang="en-US" altLang="ja-JP" sz="1200" b="1" dirty="0" smtClean="0">
+                <a:solidFill>
+                  <a:schemeClr val="tx1"/>
+                </a:solidFill>
+              </a:rPr>
+              <a:t> </a:t>
+            </a:r>
+            <a:r>
+              <a:rPr lang="en-US" altLang="ja-JP" sz="1200" b="1" dirty="0" err="1" smtClean="0">
+                <a:solidFill>
+                  <a:schemeClr val="tx1"/>
+                </a:solidFill>
+              </a:rPr>
+              <a:t>th:value</a:t>
+            </a:r>
+            <a:r>
+              <a:rPr lang="en-US" altLang="ja-JP" sz="1200" b="1" dirty="0" smtClean="0">
+                <a:solidFill>
+                  <a:schemeClr val="tx1"/>
+                </a:solidFill>
+              </a:rPr>
+              <a:t>="${</a:t>
+            </a:r>
+            <a:r>
+              <a:rPr lang="en-US" altLang="ja-JP" sz="1200" b="1" dirty="0" err="1" smtClean="0">
+                <a:solidFill>
+                  <a:schemeClr val="tx1"/>
+                </a:solidFill>
+              </a:rPr>
+              <a:t>price</a:t>
+            </a:r>
+            <a:r>
+              <a:rPr lang="en-US" altLang="ja-JP" sz="1200" b="1" dirty="0" err="1" smtClean="0">
+                <a:solidFill>
+                  <a:schemeClr val="tx1"/>
+                </a:solidFill>
+              </a:rPr>
+              <a:t>.key</a:t>
+            </a:r>
+            <a:r>
+              <a:rPr lang="en-US" altLang="ja-JP" sz="1200" b="1" dirty="0" smtClean="0">
+                <a:solidFill>
+                  <a:schemeClr val="tx1"/>
+                </a:solidFill>
+              </a:rPr>
+              <a:t>}“ </a:t>
+            </a:r>
+            <a:endParaRPr lang="en-US" altLang="ja-JP" sz="1200" b="1" dirty="0" smtClean="0">
+              <a:solidFill>
+                <a:schemeClr val="tx1"/>
+              </a:solidFill>
+            </a:endParaRPr>
+          </a:p>
+          <a:p>
+            <a:r>
+              <a:rPr lang="en-US" altLang="ja-JP" sz="1200" b="1" dirty="0">
+                <a:solidFill>
+                  <a:schemeClr val="tx1"/>
+                </a:solidFill>
+              </a:rPr>
+              <a:t> </a:t>
+            </a:r>
+            <a:r>
+              <a:rPr lang="en-US" altLang="ja-JP" sz="1200" b="1" dirty="0" smtClean="0">
+                <a:solidFill>
+                  <a:schemeClr val="tx1"/>
+                </a:solidFill>
+              </a:rPr>
+              <a:t>     </a:t>
+            </a:r>
+            <a:r>
+              <a:rPr lang="en-US" altLang="ja-JP" sz="1200" b="1" dirty="0" err="1" smtClean="0">
+                <a:solidFill>
+                  <a:schemeClr val="tx1"/>
+                </a:solidFill>
+              </a:rPr>
+              <a:t>th:text</a:t>
+            </a:r>
+            <a:r>
+              <a:rPr lang="en-US" altLang="ja-JP" sz="1200" b="1" dirty="0" smtClean="0">
+                <a:solidFill>
+                  <a:schemeClr val="tx1"/>
+                </a:solidFill>
+              </a:rPr>
+              <a:t>="${</a:t>
+            </a:r>
+            <a:r>
+              <a:rPr lang="en-US" altLang="ja-JP" sz="1200" b="1" dirty="0" err="1" smtClean="0">
+                <a:solidFill>
+                  <a:schemeClr val="tx1"/>
+                </a:solidFill>
+              </a:rPr>
+              <a:t>price</a:t>
+            </a:r>
+            <a:r>
+              <a:rPr lang="en-US" altLang="ja-JP" sz="1200" b="1" dirty="0" err="1" smtClean="0">
+                <a:solidFill>
+                  <a:schemeClr val="tx1"/>
+                </a:solidFill>
+              </a:rPr>
+              <a:t>.value</a:t>
+            </a:r>
+            <a:r>
+              <a:rPr lang="en-US" altLang="ja-JP" sz="1200" b="1" dirty="0" smtClean="0">
+                <a:solidFill>
+                  <a:schemeClr val="tx1"/>
+                </a:solidFill>
+              </a:rPr>
+              <a:t>}"&gt;</a:t>
+            </a:r>
+          </a:p>
+          <a:p>
+            <a:r>
+              <a:rPr lang="en-US" altLang="ja-JP" sz="1200" b="1" dirty="0">
+                <a:solidFill>
+                  <a:schemeClr val="tx1"/>
+                </a:solidFill>
+              </a:rPr>
+              <a:t> </a:t>
+            </a:r>
+            <a:r>
+              <a:rPr lang="en-US" altLang="ja-JP" sz="1200" b="1" dirty="0" smtClean="0">
+                <a:solidFill>
+                  <a:schemeClr val="tx1"/>
+                </a:solidFill>
+              </a:rPr>
+              <a:t>     Order Status</a:t>
+            </a:r>
+          </a:p>
+          <a:p>
+            <a:r>
+              <a:rPr lang="en-US" altLang="ja-JP" sz="1200" b="1" dirty="0">
+                <a:solidFill>
+                  <a:schemeClr val="tx1"/>
+                </a:solidFill>
+              </a:rPr>
+              <a:t> </a:t>
+            </a:r>
+            <a:r>
+              <a:rPr lang="en-US" altLang="ja-JP" sz="1200" b="1" dirty="0" smtClean="0">
+                <a:solidFill>
+                  <a:schemeClr val="tx1"/>
+                </a:solidFill>
+              </a:rPr>
+              <a:t>   &lt;/</a:t>
+            </a:r>
+            <a:r>
+              <a:rPr lang="en-US" altLang="ja-JP" sz="1200" b="1" dirty="0">
+                <a:solidFill>
+                  <a:schemeClr val="tx1"/>
+                </a:solidFill>
+              </a:rPr>
+              <a:t>option</a:t>
+            </a:r>
+            <a:r>
+              <a:rPr lang="en-US" altLang="ja-JP" sz="1200" b="1" dirty="0" smtClean="0">
+                <a:solidFill>
+                  <a:schemeClr val="tx1"/>
+                </a:solidFill>
+              </a:rPr>
+              <a:t>&gt;</a:t>
+            </a:r>
+          </a:p>
+          <a:p>
+            <a:r>
+              <a:rPr lang="en-US" altLang="ja-JP" sz="1200" b="1" dirty="0" smtClean="0">
+                <a:solidFill>
+                  <a:schemeClr val="tx1"/>
+                </a:solidFill>
+              </a:rPr>
+              <a:t>&lt;/select&gt;</a:t>
+            </a:r>
+          </a:p>
+        </p:txBody>
+      </p:sp>
     </p:spTree>
   </p:cSld>
   <p:clrMapOvr>

</xml_diff>